<commit_message>
minor changes to a number of slides
</commit_message>
<xml_diff>
--- a/PowerPoint Slides/00 - Teaching Compiler Design.pptx
+++ b/PowerPoint Slides/00 - Teaching Compiler Design.pptx
@@ -25,7 +25,7 @@
     <p:sldId id="267" r:id="rId13"/>
   </p:sldIdLst>
   <p:sldSz cx="9144000" cy="6858000" type="screen4x3"/>
-  <p:notesSz cx="7010400" cy="9296400"/>
+  <p:notesSz cx="7315200" cy="9601200"/>
   <p:defaultTextStyle>
     <a:defPPr>
       <a:defRPr lang="en-US"/>
@@ -168,12 +168,12 @@
     </p:ext>
     <p:ext uri="{2D200454-40CA-4A62-9FC3-DE9A4176ACB9}">
       <p15:notesGuideLst xmlns:p15="http://schemas.microsoft.com/office/powerpoint/2012/main">
-        <p15:guide id="1" orient="horz" pos="2928">
+        <p15:guide id="1" orient="horz" pos="3024" userDrawn="1">
           <p15:clr>
             <a:srgbClr val="A4A3A4"/>
           </p15:clr>
         </p15:guide>
-        <p15:guide id="2" pos="2208">
+        <p15:guide id="2" pos="2304" userDrawn="1">
           <p15:clr>
             <a:srgbClr val="A4A3A4"/>
           </p15:clr>
@@ -221,8 +221,8 @@
         </p:nvSpPr>
         <p:spPr bwMode="auto">
           <a:xfrm>
-            <a:off x="3971925" y="0"/>
-            <a:ext cx="3038475" cy="465138"/>
+            <a:off x="4144618" y="0"/>
+            <a:ext cx="3170583" cy="480388"/>
           </a:xfrm>
           <a:prstGeom prst="rect">
             <a:avLst/>
@@ -237,13 +237,13 @@
           <a:effectLst/>
         </p:spPr>
         <p:txBody>
-          <a:bodyPr vert="horz" wrap="square" lIns="93177" tIns="46589" rIns="93177" bIns="46589" numCol="1" anchor="t" anchorCtr="0" compatLnSpc="1">
+          <a:bodyPr vert="horz" wrap="square" lIns="96653" tIns="48327" rIns="96653" bIns="48327" numCol="1" anchor="t" anchorCtr="0" compatLnSpc="1">
             <a:prstTxWarp prst="textNoShape">
               <a:avLst/>
             </a:prstTxWarp>
           </a:bodyPr>
           <a:lstStyle>
-            <a:lvl1pPr algn="r" defTabSz="931863">
+            <a:lvl1pPr algn="r" defTabSz="966621">
               <a:defRPr sz="1200"/>
             </a:lvl1pPr>
           </a:lstStyle>
@@ -270,8 +270,8 @@
         </p:nvSpPr>
         <p:spPr bwMode="auto">
           <a:xfrm>
-            <a:off x="3971925" y="8831263"/>
-            <a:ext cx="3038475" cy="465137"/>
+            <a:off x="4144618" y="9120813"/>
+            <a:ext cx="3170583" cy="480387"/>
           </a:xfrm>
           <a:prstGeom prst="rect">
             <a:avLst/>
@@ -286,13 +286,13 @@
           <a:effectLst/>
         </p:spPr>
         <p:txBody>
-          <a:bodyPr vert="horz" wrap="square" lIns="93177" tIns="46589" rIns="93177" bIns="46589" numCol="1" anchor="b" anchorCtr="0" compatLnSpc="1">
+          <a:bodyPr vert="horz" wrap="square" lIns="96653" tIns="48327" rIns="96653" bIns="48327" numCol="1" anchor="b" anchorCtr="0" compatLnSpc="1">
             <a:prstTxWarp prst="textNoShape">
               <a:avLst/>
             </a:prstTxWarp>
           </a:bodyPr>
           <a:lstStyle>
-            <a:lvl1pPr algn="r" defTabSz="931863">
+            <a:lvl1pPr algn="r" defTabSz="966621">
               <a:defRPr sz="1200"/>
             </a:lvl1pPr>
           </a:lstStyle>
@@ -304,7 +304,7 @@
               <a:t>0-</a:t>
             </a:r>
             <a:fld id="{45FCC4B9-5925-44CA-B20D-BBBBADEE7E00}" type="slidenum">
-              <a:rPr lang="en-US" sz="1100" smtClean="0">
+              <a:rPr lang="en-US" sz="1100">
                 <a:latin typeface="+mn-lt"/>
               </a:rPr>
               <a:pPr/>
@@ -365,7 +365,7 @@
         <p:spPr bwMode="auto">
           <a:xfrm>
             <a:off x="0" y="0"/>
-            <a:ext cx="3038475" cy="465138"/>
+            <a:ext cx="3170583" cy="480388"/>
           </a:xfrm>
           <a:prstGeom prst="rect">
             <a:avLst/>
@@ -380,13 +380,13 @@
           <a:effectLst/>
         </p:spPr>
         <p:txBody>
-          <a:bodyPr vert="horz" wrap="square" lIns="93177" tIns="46589" rIns="93177" bIns="46589" numCol="1" anchor="t" anchorCtr="0" compatLnSpc="1">
+          <a:bodyPr vert="horz" wrap="square" lIns="96653" tIns="48327" rIns="96653" bIns="48327" numCol="1" anchor="t" anchorCtr="0" compatLnSpc="1">
             <a:prstTxWarp prst="textNoShape">
               <a:avLst/>
             </a:prstTxWarp>
           </a:bodyPr>
           <a:lstStyle>
-            <a:lvl1pPr algn="l" defTabSz="931863">
+            <a:lvl1pPr algn="l" defTabSz="966621">
               <a:defRPr sz="1200"/>
             </a:lvl1pPr>
           </a:lstStyle>
@@ -410,8 +410,8 @@
         </p:nvSpPr>
         <p:spPr bwMode="auto">
           <a:xfrm>
-            <a:off x="3971925" y="0"/>
-            <a:ext cx="3038475" cy="465138"/>
+            <a:off x="4144618" y="0"/>
+            <a:ext cx="3170583" cy="480388"/>
           </a:xfrm>
           <a:prstGeom prst="rect">
             <a:avLst/>
@@ -426,13 +426,13 @@
           <a:effectLst/>
         </p:spPr>
         <p:txBody>
-          <a:bodyPr vert="horz" wrap="square" lIns="93177" tIns="46589" rIns="93177" bIns="46589" numCol="1" anchor="t" anchorCtr="0" compatLnSpc="1">
+          <a:bodyPr vert="horz" wrap="square" lIns="96653" tIns="48327" rIns="96653" bIns="48327" numCol="1" anchor="t" anchorCtr="0" compatLnSpc="1">
             <a:prstTxWarp prst="textNoShape">
               <a:avLst/>
             </a:prstTxWarp>
           </a:bodyPr>
           <a:lstStyle>
-            <a:lvl1pPr algn="r" defTabSz="931863">
+            <a:lvl1pPr algn="r" defTabSz="966621">
               <a:defRPr sz="1200"/>
             </a:lvl1pPr>
           </a:lstStyle>
@@ -453,8 +453,8 @@
         </p:nvSpPr>
         <p:spPr bwMode="auto">
           <a:xfrm>
-            <a:off x="1181100" y="696913"/>
-            <a:ext cx="4648200" cy="3486150"/>
+            <a:off x="1257300" y="719138"/>
+            <a:ext cx="4800600" cy="3600450"/>
           </a:xfrm>
           <a:prstGeom prst="rect">
             <a:avLst/>
@@ -483,8 +483,8 @@
         </p:nvSpPr>
         <p:spPr bwMode="auto">
           <a:xfrm>
-            <a:off x="935038" y="4416425"/>
-            <a:ext cx="5140325" cy="4183063"/>
+            <a:off x="975693" y="4561226"/>
+            <a:ext cx="5363817" cy="4320213"/>
           </a:xfrm>
           <a:prstGeom prst="rect">
             <a:avLst/>
@@ -499,7 +499,7 @@
           <a:effectLst/>
         </p:spPr>
         <p:txBody>
-          <a:bodyPr vert="horz" wrap="square" lIns="93177" tIns="46589" rIns="93177" bIns="46589" numCol="1" anchor="t" anchorCtr="0" compatLnSpc="1">
+          <a:bodyPr vert="horz" wrap="square" lIns="96653" tIns="48327" rIns="96653" bIns="48327" numCol="1" anchor="t" anchorCtr="0" compatLnSpc="1">
             <a:prstTxWarp prst="textNoShape">
               <a:avLst/>
             </a:prstTxWarp>
@@ -554,8 +554,8 @@
         </p:nvSpPr>
         <p:spPr bwMode="auto">
           <a:xfrm>
-            <a:off x="0" y="8831263"/>
-            <a:ext cx="3038475" cy="465137"/>
+            <a:off x="0" y="9120813"/>
+            <a:ext cx="3170583" cy="480387"/>
           </a:xfrm>
           <a:prstGeom prst="rect">
             <a:avLst/>
@@ -570,13 +570,13 @@
           <a:effectLst/>
         </p:spPr>
         <p:txBody>
-          <a:bodyPr vert="horz" wrap="square" lIns="93177" tIns="46589" rIns="93177" bIns="46589" numCol="1" anchor="b" anchorCtr="0" compatLnSpc="1">
+          <a:bodyPr vert="horz" wrap="square" lIns="96653" tIns="48327" rIns="96653" bIns="48327" numCol="1" anchor="b" anchorCtr="0" compatLnSpc="1">
             <a:prstTxWarp prst="textNoShape">
               <a:avLst/>
             </a:prstTxWarp>
           </a:bodyPr>
           <a:lstStyle>
-            <a:lvl1pPr algn="l" defTabSz="931863">
+            <a:lvl1pPr algn="l" defTabSz="966621">
               <a:defRPr sz="1200"/>
             </a:lvl1pPr>
           </a:lstStyle>
@@ -597,8 +597,8 @@
         </p:nvSpPr>
         <p:spPr bwMode="auto">
           <a:xfrm>
-            <a:off x="3971925" y="8831263"/>
-            <a:ext cx="3038475" cy="465137"/>
+            <a:off x="4144618" y="9120813"/>
+            <a:ext cx="3170583" cy="480387"/>
           </a:xfrm>
           <a:prstGeom prst="rect">
             <a:avLst/>
@@ -613,13 +613,13 @@
           <a:effectLst/>
         </p:spPr>
         <p:txBody>
-          <a:bodyPr vert="horz" wrap="square" lIns="93177" tIns="46589" rIns="93177" bIns="46589" numCol="1" anchor="b" anchorCtr="0" compatLnSpc="1">
+          <a:bodyPr vert="horz" wrap="square" lIns="96653" tIns="48327" rIns="96653" bIns="48327" numCol="1" anchor="b" anchorCtr="0" compatLnSpc="1">
             <a:prstTxWarp prst="textNoShape">
               <a:avLst/>
             </a:prstTxWarp>
           </a:bodyPr>
           <a:lstStyle>
-            <a:lvl1pPr algn="r" defTabSz="931863">
+            <a:lvl1pPr algn="r" defTabSz="966621">
               <a:defRPr sz="1200"/>
             </a:lvl1pPr>
           </a:lstStyle>
@@ -2805,15 +2805,7 @@
           <a:p>
             <a:r>
               <a:rPr lang="en-US" dirty="0"/>
-              <a:t>Implement the project in a language other than Java (e.g., Python, </a:t>
-            </a:r>
-            <a:r>
-              <a:rPr lang="en-US" dirty="0" err="1"/>
-              <a:t>Kotlin</a:t>
-            </a:r>
-            <a:r>
-              <a:rPr lang="en-US" dirty="0"/>
-              <a:t>, or C#)</a:t>
+              <a:t>Implement the project in a language other than Java (e.g., Kotlin, C++, Python, or C#)</a:t>
             </a:r>
           </a:p>
           <a:p>
@@ -3000,15 +2992,7 @@
             <a:pPr lvl="1"/>
             <a:r>
               <a:rPr lang="en-US" dirty="0"/>
-              <a:t>Disassembler </a:t>
-            </a:r>
-            <a:r>
-              <a:rPr lang="en-US"/>
-              <a:t>for CVM </a:t>
-            </a:r>
-            <a:r>
-              <a:rPr lang="en-US" dirty="0"/>
-              <a:t>machine code</a:t>
+              <a:t>Disassembler for CVM machine code</a:t>
             </a:r>
           </a:p>
           <a:p>
@@ -3020,7 +3004,7 @@
           <a:p>
             <a:r>
               <a:rPr lang="en-US" dirty="0"/>
-              <a:t>Javadoc files for the full CPRL compiler</a:t>
+              <a:t>Language documentation files for the full CPRL compiler</a:t>
             </a:r>
           </a:p>
           <a:p>
@@ -3032,7 +3016,7 @@
           <a:p>
             <a:r>
               <a:rPr lang="en-US" dirty="0"/>
-              <a:t>Sample Windows batch files and Bash shell scripts for running and testing various stages of your compiler</a:t>
+              <a:t>Sample Windows command files and Bash shell scripts for running and testing various stages of your compiler</a:t>
             </a:r>
           </a:p>
         </p:txBody>
@@ -3733,7 +3717,7 @@
                 <a:latin typeface="Arial" panose="020B0604020202020204" pitchFamily="34" charset="0"/>
                 <a:cs typeface="Arial" panose="020B0604020202020204" pitchFamily="34" charset="0"/>
               </a:rPr>
-              <a:t>no tools other than compiler and IDE (e.g., Java and Eclipse)</a:t>
+              <a:t>no tools other than compiler and IDE (e.g., Eclipse and Java)</a:t>
             </a:r>
           </a:p>
         </p:txBody>
@@ -4254,12 +4238,6 @@
               <a:t>flexible, but Java is recommended.  Slides, handouts, and skeletal code all use Java.</a:t>
             </a:r>
           </a:p>
-          <a:p>
-            <a:endParaRPr lang="en-US" dirty="0">
-              <a:latin typeface="Arial" panose="020B0604020202020204" pitchFamily="34" charset="0"/>
-              <a:cs typeface="Arial" panose="020B0604020202020204" pitchFamily="34" charset="0"/>
-            </a:endParaRPr>
-          </a:p>
         </p:txBody>
       </p:sp>
       <p:sp>
@@ -4583,15 +4561,7 @@
             </a:pPr>
             <a:r>
               <a:rPr lang="en-US" dirty="0"/>
-              <a:t>“This pattern shows how to implement parsing decisions that use a single token of </a:t>
-            </a:r>
-            <a:r>
-              <a:rPr lang="en-US" dirty="0" err="1"/>
-              <a:t>lookahead</a:t>
-            </a:r>
-            <a:r>
-              <a:rPr lang="en-US" dirty="0"/>
-              <a:t>.  It’s the weakest form of recursive-descent parser, but the easiest to understand and implement.  If you can conveniently implement your language with this LL(1) pattern you should do so.”     – Terence Parr</a:t>
+              <a:t>“This pattern shows how to implement parsing decisions that use a single token of lookahead.  It’s the weakest form of recursive-descent parser, but the easiest to understand and implement.  If you can conveniently implement your language with this LL(1) pattern you should do so.”     – Terence Parr</a:t>
             </a:r>
           </a:p>
           <a:p>

</xml_diff>